<commit_message>
uml: Tweak SD chapter
</commit_message>
<xml_diff>
--- a/diagrams/uml/sequenceDiagrams/alternativePaths/minefieldCell.pptx
+++ b/diagrams/uml/sequenceDiagrams/alternativePaths/minefieldCell.pptx
@@ -104,6 +104,22 @@
       </a:defRPr>
     </a:lvl9pPr>
   </p:defaultTextStyle>
+  <p:extLst>
+    <p:ext uri="{EFAFB233-063F-42B5-8137-9DF3F51BA10A}">
+      <p15:sldGuideLst xmlns:p15="http://schemas.microsoft.com/office/powerpoint/2012/main">
+        <p15:guide id="1" orient="horz" pos="2160">
+          <p15:clr>
+            <a:srgbClr val="A4A3A4"/>
+          </p15:clr>
+        </p15:guide>
+        <p15:guide id="2" pos="2880">
+          <p15:clr>
+            <a:srgbClr val="A4A3A4"/>
+          </p15:clr>
+        </p15:guide>
+      </p15:sldGuideLst>
+    </p:ext>
+  </p:extLst>
 </p:presentation>
 </file>
 
@@ -145,7 +161,7 @@
           <a:lstStyle/>
           <a:p>
             <a:r>
-              <a:rPr lang="en-US" smtClean="0"/>
+              <a:rPr lang="en-US"/>
               <a:t>Click to edit Master title style</a:t>
             </a:r>
             <a:endParaRPr lang="en-SG"/>
@@ -264,7 +280,7 @@
           </a:lstStyle>
           <a:p>
             <a:r>
-              <a:rPr lang="en-US" smtClean="0"/>
+              <a:rPr lang="en-US"/>
               <a:t>Click to edit Master subtitle style</a:t>
             </a:r>
             <a:endParaRPr lang="en-SG"/>
@@ -288,7 +304,7 @@
           <a:p>
             <a:fld id="{4452D880-2273-4D43-A19E-DFED02881EAB}" type="datetimeFigureOut">
               <a:rPr lang="en-SG" smtClean="0"/>
-              <a:t>1/6/2017</a:t>
+              <a:t>9/1/2024</a:t>
             </a:fld>
             <a:endParaRPr lang="en-SG"/>
           </a:p>
@@ -382,7 +398,7 @@
           <a:lstStyle/>
           <a:p>
             <a:r>
-              <a:rPr lang="en-US" smtClean="0"/>
+              <a:rPr lang="en-US"/>
               <a:t>Click to edit Master title style</a:t>
             </a:r>
             <a:endParaRPr lang="en-SG"/>
@@ -406,35 +422,35 @@
           <a:p>
             <a:pPr lvl="0"/>
             <a:r>
-              <a:rPr lang="en-US" smtClean="0"/>
+              <a:rPr lang="en-US"/>
               <a:t>Click to edit Master text styles</a:t>
             </a:r>
           </a:p>
           <a:p>
             <a:pPr lvl="1"/>
             <a:r>
-              <a:rPr lang="en-US" smtClean="0"/>
+              <a:rPr lang="en-US"/>
               <a:t>Second level</a:t>
             </a:r>
           </a:p>
           <a:p>
             <a:pPr lvl="2"/>
             <a:r>
-              <a:rPr lang="en-US" smtClean="0"/>
+              <a:rPr lang="en-US"/>
               <a:t>Third level</a:t>
             </a:r>
           </a:p>
           <a:p>
             <a:pPr lvl="3"/>
             <a:r>
-              <a:rPr lang="en-US" smtClean="0"/>
+              <a:rPr lang="en-US"/>
               <a:t>Fourth level</a:t>
             </a:r>
           </a:p>
           <a:p>
             <a:pPr lvl="4"/>
             <a:r>
-              <a:rPr lang="en-US" smtClean="0"/>
+              <a:rPr lang="en-US"/>
               <a:t>Fifth level</a:t>
             </a:r>
             <a:endParaRPr lang="en-SG"/>
@@ -458,7 +474,7 @@
           <a:p>
             <a:fld id="{4452D880-2273-4D43-A19E-DFED02881EAB}" type="datetimeFigureOut">
               <a:rPr lang="en-SG" smtClean="0"/>
-              <a:t>1/6/2017</a:t>
+              <a:t>9/1/2024</a:t>
             </a:fld>
             <a:endParaRPr lang="en-SG"/>
           </a:p>
@@ -557,7 +573,7 @@
           <a:lstStyle/>
           <a:p>
             <a:r>
-              <a:rPr lang="en-US" smtClean="0"/>
+              <a:rPr lang="en-US"/>
               <a:t>Click to edit Master title style</a:t>
             </a:r>
             <a:endParaRPr lang="en-SG"/>
@@ -586,35 +602,35 @@
           <a:p>
             <a:pPr lvl="0"/>
             <a:r>
-              <a:rPr lang="en-US" smtClean="0"/>
+              <a:rPr lang="en-US"/>
               <a:t>Click to edit Master text styles</a:t>
             </a:r>
           </a:p>
           <a:p>
             <a:pPr lvl="1"/>
             <a:r>
-              <a:rPr lang="en-US" smtClean="0"/>
+              <a:rPr lang="en-US"/>
               <a:t>Second level</a:t>
             </a:r>
           </a:p>
           <a:p>
             <a:pPr lvl="2"/>
             <a:r>
-              <a:rPr lang="en-US" smtClean="0"/>
+              <a:rPr lang="en-US"/>
               <a:t>Third level</a:t>
             </a:r>
           </a:p>
           <a:p>
             <a:pPr lvl="3"/>
             <a:r>
-              <a:rPr lang="en-US" smtClean="0"/>
+              <a:rPr lang="en-US"/>
               <a:t>Fourth level</a:t>
             </a:r>
           </a:p>
           <a:p>
             <a:pPr lvl="4"/>
             <a:r>
-              <a:rPr lang="en-US" smtClean="0"/>
+              <a:rPr lang="en-US"/>
               <a:t>Fifth level</a:t>
             </a:r>
             <a:endParaRPr lang="en-SG"/>
@@ -638,7 +654,7 @@
           <a:p>
             <a:fld id="{4452D880-2273-4D43-A19E-DFED02881EAB}" type="datetimeFigureOut">
               <a:rPr lang="en-SG" smtClean="0"/>
-              <a:t>1/6/2017</a:t>
+              <a:t>9/1/2024</a:t>
             </a:fld>
             <a:endParaRPr lang="en-SG"/>
           </a:p>
@@ -732,7 +748,7 @@
           <a:lstStyle/>
           <a:p>
             <a:r>
-              <a:rPr lang="en-US" smtClean="0"/>
+              <a:rPr lang="en-US"/>
               <a:t>Click to edit Master title style</a:t>
             </a:r>
             <a:endParaRPr lang="en-SG"/>
@@ -756,35 +772,35 @@
           <a:p>
             <a:pPr lvl="0"/>
             <a:r>
-              <a:rPr lang="en-US" smtClean="0"/>
+              <a:rPr lang="en-US"/>
               <a:t>Click to edit Master text styles</a:t>
             </a:r>
           </a:p>
           <a:p>
             <a:pPr lvl="1"/>
             <a:r>
-              <a:rPr lang="en-US" smtClean="0"/>
+              <a:rPr lang="en-US"/>
               <a:t>Second level</a:t>
             </a:r>
           </a:p>
           <a:p>
             <a:pPr lvl="2"/>
             <a:r>
-              <a:rPr lang="en-US" smtClean="0"/>
+              <a:rPr lang="en-US"/>
               <a:t>Third level</a:t>
             </a:r>
           </a:p>
           <a:p>
             <a:pPr lvl="3"/>
             <a:r>
-              <a:rPr lang="en-US" smtClean="0"/>
+              <a:rPr lang="en-US"/>
               <a:t>Fourth level</a:t>
             </a:r>
           </a:p>
           <a:p>
             <a:pPr lvl="4"/>
             <a:r>
-              <a:rPr lang="en-US" smtClean="0"/>
+              <a:rPr lang="en-US"/>
               <a:t>Fifth level</a:t>
             </a:r>
             <a:endParaRPr lang="en-SG"/>
@@ -808,7 +824,7 @@
           <a:p>
             <a:fld id="{4452D880-2273-4D43-A19E-DFED02881EAB}" type="datetimeFigureOut">
               <a:rPr lang="en-SG" smtClean="0"/>
-              <a:t>1/6/2017</a:t>
+              <a:t>9/1/2024</a:t>
             </a:fld>
             <a:endParaRPr lang="en-SG"/>
           </a:p>
@@ -911,7 +927,7 @@
           </a:lstStyle>
           <a:p>
             <a:r>
-              <a:rPr lang="en-US" smtClean="0"/>
+              <a:rPr lang="en-US"/>
               <a:t>Click to edit Master title style</a:t>
             </a:r>
             <a:endParaRPr lang="en-SG"/>
@@ -1031,7 +1047,7 @@
           <a:p>
             <a:pPr lvl="0"/>
             <a:r>
-              <a:rPr lang="en-US" smtClean="0"/>
+              <a:rPr lang="en-US"/>
               <a:t>Click to edit Master text styles</a:t>
             </a:r>
           </a:p>
@@ -1054,7 +1070,7 @@
           <a:p>
             <a:fld id="{4452D880-2273-4D43-A19E-DFED02881EAB}" type="datetimeFigureOut">
               <a:rPr lang="en-SG" smtClean="0"/>
-              <a:t>1/6/2017</a:t>
+              <a:t>9/1/2024</a:t>
             </a:fld>
             <a:endParaRPr lang="en-SG"/>
           </a:p>
@@ -1148,7 +1164,7 @@
           <a:lstStyle/>
           <a:p>
             <a:r>
-              <a:rPr lang="en-US" smtClean="0"/>
+              <a:rPr lang="en-US"/>
               <a:t>Click to edit Master title style</a:t>
             </a:r>
             <a:endParaRPr lang="en-SG"/>
@@ -1205,35 +1221,35 @@
           <a:p>
             <a:pPr lvl="0"/>
             <a:r>
-              <a:rPr lang="en-US" smtClean="0"/>
+              <a:rPr lang="en-US"/>
               <a:t>Click to edit Master text styles</a:t>
             </a:r>
           </a:p>
           <a:p>
             <a:pPr lvl="1"/>
             <a:r>
-              <a:rPr lang="en-US" smtClean="0"/>
+              <a:rPr lang="en-US"/>
               <a:t>Second level</a:t>
             </a:r>
           </a:p>
           <a:p>
             <a:pPr lvl="2"/>
             <a:r>
-              <a:rPr lang="en-US" smtClean="0"/>
+              <a:rPr lang="en-US"/>
               <a:t>Third level</a:t>
             </a:r>
           </a:p>
           <a:p>
             <a:pPr lvl="3"/>
             <a:r>
-              <a:rPr lang="en-US" smtClean="0"/>
+              <a:rPr lang="en-US"/>
               <a:t>Fourth level</a:t>
             </a:r>
           </a:p>
           <a:p>
             <a:pPr lvl="4"/>
             <a:r>
-              <a:rPr lang="en-US" smtClean="0"/>
+              <a:rPr lang="en-US"/>
               <a:t>Fifth level</a:t>
             </a:r>
             <a:endParaRPr lang="en-SG"/>
@@ -1290,35 +1306,35 @@
           <a:p>
             <a:pPr lvl="0"/>
             <a:r>
-              <a:rPr lang="en-US" smtClean="0"/>
+              <a:rPr lang="en-US"/>
               <a:t>Click to edit Master text styles</a:t>
             </a:r>
           </a:p>
           <a:p>
             <a:pPr lvl="1"/>
             <a:r>
-              <a:rPr lang="en-US" smtClean="0"/>
+              <a:rPr lang="en-US"/>
               <a:t>Second level</a:t>
             </a:r>
           </a:p>
           <a:p>
             <a:pPr lvl="2"/>
             <a:r>
-              <a:rPr lang="en-US" smtClean="0"/>
+              <a:rPr lang="en-US"/>
               <a:t>Third level</a:t>
             </a:r>
           </a:p>
           <a:p>
             <a:pPr lvl="3"/>
             <a:r>
-              <a:rPr lang="en-US" smtClean="0"/>
+              <a:rPr lang="en-US"/>
               <a:t>Fourth level</a:t>
             </a:r>
           </a:p>
           <a:p>
             <a:pPr lvl="4"/>
             <a:r>
-              <a:rPr lang="en-US" smtClean="0"/>
+              <a:rPr lang="en-US"/>
               <a:t>Fifth level</a:t>
             </a:r>
             <a:endParaRPr lang="en-SG"/>
@@ -1342,7 +1358,7 @@
           <a:p>
             <a:fld id="{4452D880-2273-4D43-A19E-DFED02881EAB}" type="datetimeFigureOut">
               <a:rPr lang="en-SG" smtClean="0"/>
-              <a:t>1/6/2017</a:t>
+              <a:t>9/1/2024</a:t>
             </a:fld>
             <a:endParaRPr lang="en-SG"/>
           </a:p>
@@ -1440,7 +1456,7 @@
           </a:lstStyle>
           <a:p>
             <a:r>
-              <a:rPr lang="en-US" smtClean="0"/>
+              <a:rPr lang="en-US"/>
               <a:t>Click to edit Master title style</a:t>
             </a:r>
             <a:endParaRPr lang="en-SG"/>
@@ -1506,7 +1522,7 @@
           <a:p>
             <a:pPr lvl="0"/>
             <a:r>
-              <a:rPr lang="en-US" smtClean="0"/>
+              <a:rPr lang="en-US"/>
               <a:t>Click to edit Master text styles</a:t>
             </a:r>
           </a:p>
@@ -1562,35 +1578,35 @@
           <a:p>
             <a:pPr lvl="0"/>
             <a:r>
-              <a:rPr lang="en-US" smtClean="0"/>
+              <a:rPr lang="en-US"/>
               <a:t>Click to edit Master text styles</a:t>
             </a:r>
           </a:p>
           <a:p>
             <a:pPr lvl="1"/>
             <a:r>
-              <a:rPr lang="en-US" smtClean="0"/>
+              <a:rPr lang="en-US"/>
               <a:t>Second level</a:t>
             </a:r>
           </a:p>
           <a:p>
             <a:pPr lvl="2"/>
             <a:r>
-              <a:rPr lang="en-US" smtClean="0"/>
+              <a:rPr lang="en-US"/>
               <a:t>Third level</a:t>
             </a:r>
           </a:p>
           <a:p>
             <a:pPr lvl="3"/>
             <a:r>
-              <a:rPr lang="en-US" smtClean="0"/>
+              <a:rPr lang="en-US"/>
               <a:t>Fourth level</a:t>
             </a:r>
           </a:p>
           <a:p>
             <a:pPr lvl="4"/>
             <a:r>
-              <a:rPr lang="en-US" smtClean="0"/>
+              <a:rPr lang="en-US"/>
               <a:t>Fifth level</a:t>
             </a:r>
             <a:endParaRPr lang="en-SG"/>
@@ -1656,7 +1672,7 @@
           <a:p>
             <a:pPr lvl="0"/>
             <a:r>
-              <a:rPr lang="en-US" smtClean="0"/>
+              <a:rPr lang="en-US"/>
               <a:t>Click to edit Master text styles</a:t>
             </a:r>
           </a:p>
@@ -1712,35 +1728,35 @@
           <a:p>
             <a:pPr lvl="0"/>
             <a:r>
-              <a:rPr lang="en-US" smtClean="0"/>
+              <a:rPr lang="en-US"/>
               <a:t>Click to edit Master text styles</a:t>
             </a:r>
           </a:p>
           <a:p>
             <a:pPr lvl="1"/>
             <a:r>
-              <a:rPr lang="en-US" smtClean="0"/>
+              <a:rPr lang="en-US"/>
               <a:t>Second level</a:t>
             </a:r>
           </a:p>
           <a:p>
             <a:pPr lvl="2"/>
             <a:r>
-              <a:rPr lang="en-US" smtClean="0"/>
+              <a:rPr lang="en-US"/>
               <a:t>Third level</a:t>
             </a:r>
           </a:p>
           <a:p>
             <a:pPr lvl="3"/>
             <a:r>
-              <a:rPr lang="en-US" smtClean="0"/>
+              <a:rPr lang="en-US"/>
               <a:t>Fourth level</a:t>
             </a:r>
           </a:p>
           <a:p>
             <a:pPr lvl="4"/>
             <a:r>
-              <a:rPr lang="en-US" smtClean="0"/>
+              <a:rPr lang="en-US"/>
               <a:t>Fifth level</a:t>
             </a:r>
             <a:endParaRPr lang="en-SG"/>
@@ -1764,7 +1780,7 @@
           <a:p>
             <a:fld id="{4452D880-2273-4D43-A19E-DFED02881EAB}" type="datetimeFigureOut">
               <a:rPr lang="en-SG" smtClean="0"/>
-              <a:t>1/6/2017</a:t>
+              <a:t>9/1/2024</a:t>
             </a:fld>
             <a:endParaRPr lang="en-SG"/>
           </a:p>
@@ -1858,7 +1874,7 @@
           <a:lstStyle/>
           <a:p>
             <a:r>
-              <a:rPr lang="en-US" smtClean="0"/>
+              <a:rPr lang="en-US"/>
               <a:t>Click to edit Master title style</a:t>
             </a:r>
             <a:endParaRPr lang="en-SG"/>
@@ -1882,7 +1898,7 @@
           <a:p>
             <a:fld id="{4452D880-2273-4D43-A19E-DFED02881EAB}" type="datetimeFigureOut">
               <a:rPr lang="en-SG" smtClean="0"/>
-              <a:t>1/6/2017</a:t>
+              <a:t>9/1/2024</a:t>
             </a:fld>
             <a:endParaRPr lang="en-SG"/>
           </a:p>
@@ -1977,7 +1993,7 @@
           <a:p>
             <a:fld id="{4452D880-2273-4D43-A19E-DFED02881EAB}" type="datetimeFigureOut">
               <a:rPr lang="en-SG" smtClean="0"/>
-              <a:t>1/6/2017</a:t>
+              <a:t>9/1/2024</a:t>
             </a:fld>
             <a:endParaRPr lang="en-SG"/>
           </a:p>
@@ -2080,7 +2096,7 @@
           </a:lstStyle>
           <a:p>
             <a:r>
-              <a:rPr lang="en-US" smtClean="0"/>
+              <a:rPr lang="en-US"/>
               <a:t>Click to edit Master title style</a:t>
             </a:r>
             <a:endParaRPr lang="en-SG"/>
@@ -2137,35 +2153,35 @@
           <a:p>
             <a:pPr lvl="0"/>
             <a:r>
-              <a:rPr lang="en-US" smtClean="0"/>
+              <a:rPr lang="en-US"/>
               <a:t>Click to edit Master text styles</a:t>
             </a:r>
           </a:p>
           <a:p>
             <a:pPr lvl="1"/>
             <a:r>
-              <a:rPr lang="en-US" smtClean="0"/>
+              <a:rPr lang="en-US"/>
               <a:t>Second level</a:t>
             </a:r>
           </a:p>
           <a:p>
             <a:pPr lvl="2"/>
             <a:r>
-              <a:rPr lang="en-US" smtClean="0"/>
+              <a:rPr lang="en-US"/>
               <a:t>Third level</a:t>
             </a:r>
           </a:p>
           <a:p>
             <a:pPr lvl="3"/>
             <a:r>
-              <a:rPr lang="en-US" smtClean="0"/>
+              <a:rPr lang="en-US"/>
               <a:t>Fourth level</a:t>
             </a:r>
           </a:p>
           <a:p>
             <a:pPr lvl="4"/>
             <a:r>
-              <a:rPr lang="en-US" smtClean="0"/>
+              <a:rPr lang="en-US"/>
               <a:t>Fifth level</a:t>
             </a:r>
             <a:endParaRPr lang="en-SG"/>
@@ -2231,7 +2247,7 @@
           <a:p>
             <a:pPr lvl="0"/>
             <a:r>
-              <a:rPr lang="en-US" smtClean="0"/>
+              <a:rPr lang="en-US"/>
               <a:t>Click to edit Master text styles</a:t>
             </a:r>
           </a:p>
@@ -2254,7 +2270,7 @@
           <a:p>
             <a:fld id="{4452D880-2273-4D43-A19E-DFED02881EAB}" type="datetimeFigureOut">
               <a:rPr lang="en-SG" smtClean="0"/>
-              <a:t>1/6/2017</a:t>
+              <a:t>9/1/2024</a:t>
             </a:fld>
             <a:endParaRPr lang="en-SG"/>
           </a:p>
@@ -2357,7 +2373,7 @@
           </a:lstStyle>
           <a:p>
             <a:r>
-              <a:rPr lang="en-US" smtClean="0"/>
+              <a:rPr lang="en-US"/>
               <a:t>Click to edit Master title style</a:t>
             </a:r>
             <a:endParaRPr lang="en-SG"/>
@@ -2484,7 +2500,7 @@
           <a:p>
             <a:pPr lvl="0"/>
             <a:r>
-              <a:rPr lang="en-US" smtClean="0"/>
+              <a:rPr lang="en-US"/>
               <a:t>Click to edit Master text styles</a:t>
             </a:r>
           </a:p>
@@ -2507,7 +2523,7 @@
           <a:p>
             <a:fld id="{4452D880-2273-4D43-A19E-DFED02881EAB}" type="datetimeFigureOut">
               <a:rPr lang="en-SG" smtClean="0"/>
-              <a:t>1/6/2017</a:t>
+              <a:t>9/1/2024</a:t>
             </a:fld>
             <a:endParaRPr lang="en-SG"/>
           </a:p>
@@ -2616,7 +2632,7 @@
           <a:lstStyle/>
           <a:p>
             <a:r>
-              <a:rPr lang="en-US" smtClean="0"/>
+              <a:rPr lang="en-US"/>
               <a:t>Click to edit Master title style</a:t>
             </a:r>
             <a:endParaRPr lang="en-SG"/>
@@ -2650,35 +2666,35 @@
           <a:p>
             <a:pPr lvl="0"/>
             <a:r>
-              <a:rPr lang="en-US" smtClean="0"/>
+              <a:rPr lang="en-US"/>
               <a:t>Click to edit Master text styles</a:t>
             </a:r>
           </a:p>
           <a:p>
             <a:pPr lvl="1"/>
             <a:r>
-              <a:rPr lang="en-US" smtClean="0"/>
+              <a:rPr lang="en-US"/>
               <a:t>Second level</a:t>
             </a:r>
           </a:p>
           <a:p>
             <a:pPr lvl="2"/>
             <a:r>
-              <a:rPr lang="en-US" smtClean="0"/>
+              <a:rPr lang="en-US"/>
               <a:t>Third level</a:t>
             </a:r>
           </a:p>
           <a:p>
             <a:pPr lvl="3"/>
             <a:r>
-              <a:rPr lang="en-US" smtClean="0"/>
+              <a:rPr lang="en-US"/>
               <a:t>Fourth level</a:t>
             </a:r>
           </a:p>
           <a:p>
             <a:pPr lvl="4"/>
             <a:r>
-              <a:rPr lang="en-US" smtClean="0"/>
+              <a:rPr lang="en-US"/>
               <a:t>Fifth level</a:t>
             </a:r>
             <a:endParaRPr lang="en-SG"/>
@@ -2720,7 +2736,7 @@
           <a:p>
             <a:fld id="{4452D880-2273-4D43-A19E-DFED02881EAB}" type="datetimeFigureOut">
               <a:rPr lang="en-SG" smtClean="0"/>
-              <a:t>1/6/2017</a:t>
+              <a:t>9/1/2024</a:t>
             </a:fld>
             <a:endParaRPr lang="en-SG"/>
           </a:p>
@@ -3105,8 +3121,8 @@
         </p:nvSpPr>
         <p:spPr bwMode="auto">
           <a:xfrm>
-            <a:off x="2476456" y="2403065"/>
-            <a:ext cx="3801445" cy="1956432"/>
+            <a:off x="2195740" y="2403065"/>
+            <a:ext cx="4082162" cy="1956432"/>
           </a:xfrm>
           <a:prstGeom prst="rect">
             <a:avLst/>
@@ -3273,8 +3289,8 @@
         </p:nvSpPr>
         <p:spPr bwMode="auto">
           <a:xfrm flipH="1">
-            <a:off x="5745839" y="2242301"/>
-            <a:ext cx="0" cy="2249283"/>
+            <a:off x="5958390" y="2151441"/>
+            <a:ext cx="0" cy="2340143"/>
           </a:xfrm>
           <a:prstGeom prst="line">
             <a:avLst/>
@@ -3326,8 +3342,8 @@
         </p:nvSpPr>
         <p:spPr bwMode="auto">
           <a:xfrm>
-            <a:off x="5306656" y="1412776"/>
-            <a:ext cx="852993" cy="738664"/>
+            <a:off x="5519207" y="1628800"/>
+            <a:ext cx="852993" cy="442035"/>
           </a:xfrm>
           <a:prstGeom prst="rect">
             <a:avLst/>
@@ -3352,7 +3368,7 @@
           </a:fontRef>
         </p:style>
         <p:txBody>
-          <a:bodyPr wrap="square" tIns="182880" bIns="182880">
+          <a:bodyPr wrap="square" tIns="36000" bIns="36000">
             <a:spAutoFit/>
           </a:bodyPr>
           <a:lstStyle/>
@@ -3365,18 +3381,13 @@
               <a:buNone/>
             </a:pPr>
             <a:r>
-              <a:rPr lang="en-US" sz="2400" dirty="0" smtClean="0">
+              <a:rPr lang="en-US" sz="2400" dirty="0">
                 <a:solidFill>
                   <a:prstClr val="black"/>
                 </a:solidFill>
               </a:rPr>
               <a:t>:Cell</a:t>
             </a:r>
-            <a:endParaRPr lang="en-US" sz="2400" dirty="0">
-              <a:solidFill>
-                <a:prstClr val="black"/>
-              </a:solidFill>
-            </a:endParaRPr>
           </a:p>
         </p:txBody>
       </p:sp>
@@ -3388,7 +3399,7 @@
         </p:nvSpPr>
         <p:spPr>
           <a:xfrm flipV="1">
-            <a:off x="2476454" y="2406563"/>
+            <a:off x="2194334" y="2396796"/>
             <a:ext cx="583859" cy="403761"/>
           </a:xfrm>
           <a:prstGeom prst="snip1Rect">
@@ -3436,8 +3447,8 @@
         </p:nvSpPr>
         <p:spPr bwMode="auto">
           <a:xfrm>
-            <a:off x="2476456" y="2403065"/>
-            <a:ext cx="3718317" cy="381000"/>
+            <a:off x="2194334" y="2403065"/>
+            <a:ext cx="4000439" cy="381000"/>
           </a:xfrm>
           <a:prstGeom prst="rect">
             <a:avLst/>
@@ -3592,33 +3603,29 @@
           </a:lstStyle>
           <a:p>
             <a:r>
-              <a:rPr lang="en-US" sz="2400" dirty="0" smtClean="0">
+              <a:rPr lang="en-US" sz="2400" dirty="0">
                 <a:solidFill>
                   <a:srgbClr val="FF0000"/>
                 </a:solidFill>
                 <a:cs typeface="Arial" charset="0"/>
               </a:rPr>
-              <a:t>alt           [mined cell]</a:t>
-            </a:r>
-            <a:endParaRPr lang="en-US" sz="2400" dirty="0">
-              <a:solidFill>
-                <a:srgbClr val="FF0000"/>
-              </a:solidFill>
-              <a:cs typeface="Arial" charset="0"/>
-            </a:endParaRPr>
+              <a:t>alt            [mined cell]</a:t>
+            </a:r>
           </a:p>
         </p:txBody>
       </p:sp>
       <p:cxnSp>
         <p:nvCxnSpPr>
           <p:cNvPr id="57" name="Straight Connector 56"/>
-          <p:cNvCxnSpPr/>
+          <p:cNvCxnSpPr>
+            <a:cxnSpLocks/>
+          </p:cNvCxnSpPr>
           <p:nvPr/>
         </p:nvCxnSpPr>
         <p:spPr>
           <a:xfrm>
             <a:off x="3367851" y="2874415"/>
-            <a:ext cx="2211281" cy="0"/>
+            <a:ext cx="2443326" cy="0"/>
           </a:xfrm>
           <a:prstGeom prst="line">
             <a:avLst/>
@@ -3642,7 +3649,7 @@
         </p:nvSpPr>
         <p:spPr>
           <a:xfrm>
-            <a:off x="5598626" y="2834219"/>
+            <a:off x="5811177" y="2834219"/>
             <a:ext cx="269055" cy="378580"/>
           </a:xfrm>
           <a:prstGeom prst="rect">
@@ -3682,13 +3689,15 @@
       <p:cxnSp>
         <p:nvCxnSpPr>
           <p:cNvPr id="59" name="Straight Connector 58"/>
-          <p:cNvCxnSpPr/>
+          <p:cNvCxnSpPr>
+            <a:cxnSpLocks/>
+          </p:cNvCxnSpPr>
           <p:nvPr/>
         </p:nvCxnSpPr>
         <p:spPr>
           <a:xfrm>
-            <a:off x="3391915" y="3796836"/>
-            <a:ext cx="2211281" cy="0"/>
+            <a:off x="3391915" y="3844247"/>
+            <a:ext cx="2419262" cy="0"/>
           </a:xfrm>
           <a:prstGeom prst="line">
             <a:avLst/>
@@ -3712,7 +3721,7 @@
         </p:nvSpPr>
         <p:spPr>
           <a:xfrm>
-            <a:off x="5622690" y="3756640"/>
+            <a:off x="5835241" y="3832332"/>
             <a:ext cx="269055" cy="378580"/>
           </a:xfrm>
           <a:prstGeom prst="rect">
@@ -3752,13 +3761,16 @@
       <p:cxnSp>
         <p:nvCxnSpPr>
           <p:cNvPr id="61" name="Straight Connector 60"/>
-          <p:cNvCxnSpPr/>
+          <p:cNvCxnSpPr>
+            <a:cxnSpLocks/>
+            <a:stCxn id="52" idx="1"/>
+          </p:cNvCxnSpPr>
           <p:nvPr/>
         </p:nvCxnSpPr>
         <p:spPr>
-          <a:xfrm>
-            <a:off x="2476455" y="3316425"/>
-            <a:ext cx="3765820" cy="5895"/>
+          <a:xfrm flipV="1">
+            <a:off x="2195740" y="3322321"/>
+            <a:ext cx="4046535" cy="58960"/>
           </a:xfrm>
           <a:prstGeom prst="line">
             <a:avLst/>
@@ -3823,7 +3835,7 @@
               <a:buNone/>
             </a:pPr>
             <a:r>
-              <a:rPr lang="en-US" sz="2400" i="1" dirty="0" err="1" smtClean="0">
+              <a:rPr lang="en-US" sz="2400" dirty="0" err="1">
                 <a:solidFill>
                   <a:srgbClr val="0070C0"/>
                 </a:solidFill>
@@ -3831,18 +3843,13 @@
               <a:t>setMine</a:t>
             </a:r>
             <a:r>
-              <a:rPr lang="en-US" sz="2400" i="1" dirty="0" smtClean="0">
+              <a:rPr lang="en-US" sz="2400" dirty="0">
                 <a:solidFill>
                   <a:srgbClr val="0070C0"/>
                 </a:solidFill>
               </a:rPr>
               <a:t>()</a:t>
             </a:r>
-            <a:endParaRPr lang="en-US" sz="2400" i="1" dirty="0">
-              <a:solidFill>
-                <a:srgbClr val="0070C0"/>
-              </a:solidFill>
-            </a:endParaRPr>
           </a:p>
         </p:txBody>
       </p:sp>
@@ -3856,8 +3863,8 @@
         </p:nvSpPr>
         <p:spPr bwMode="auto">
           <a:xfrm>
-            <a:off x="3332822" y="3789430"/>
-            <a:ext cx="2386939" cy="400110"/>
+            <a:off x="3444858" y="3789040"/>
+            <a:ext cx="2432512" cy="461665"/>
           </a:xfrm>
           <a:prstGeom prst="rect">
             <a:avLst/>
@@ -3884,26 +3891,21 @@
               <a:buNone/>
             </a:pPr>
             <a:r>
-              <a:rPr lang="en-US" sz="2000" i="1" dirty="0" err="1" smtClean="0">
+              <a:rPr lang="en-US" sz="2400" dirty="0" err="1">
                 <a:solidFill>
                   <a:srgbClr val="0070C0"/>
                 </a:solidFill>
               </a:rPr>
-              <a:t>setMineCount</a:t>
-            </a:r>
-            <a:r>
-              <a:rPr lang="en-US" sz="2000" i="1" dirty="0" smtClean="0">
+              <a:t>setCount</a:t>
+            </a:r>
+            <a:r>
+              <a:rPr lang="en-US" sz="2400" dirty="0">
                 <a:solidFill>
                   <a:srgbClr val="0070C0"/>
                 </a:solidFill>
               </a:rPr>
               <a:t>(count)</a:t>
             </a:r>
-            <a:endParaRPr lang="en-US" sz="2000" i="1" dirty="0">
-              <a:solidFill>
-                <a:srgbClr val="0070C0"/>
-              </a:solidFill>
-            </a:endParaRPr>
           </a:p>
         </p:txBody>
       </p:sp>
@@ -3917,8 +3919,8 @@
         </p:nvSpPr>
         <p:spPr bwMode="auto">
           <a:xfrm flipH="1">
-            <a:off x="3219544" y="2151441"/>
-            <a:ext cx="1242" cy="3212976"/>
+            <a:off x="3220786" y="2070835"/>
+            <a:ext cx="0" cy="2635726"/>
           </a:xfrm>
           <a:prstGeom prst="line">
             <a:avLst/>
@@ -4014,8 +4016,8 @@
         </p:nvSpPr>
         <p:spPr bwMode="auto">
           <a:xfrm>
-            <a:off x="2460511" y="1412776"/>
-            <a:ext cx="1518065" cy="738664"/>
+            <a:off x="2460511" y="1628800"/>
+            <a:ext cx="1518065" cy="442035"/>
           </a:xfrm>
           <a:prstGeom prst="rect">
             <a:avLst/>
@@ -4040,7 +4042,7 @@
           </a:fontRef>
         </p:style>
         <p:txBody>
-          <a:bodyPr wrap="square" tIns="182880" bIns="182880">
+          <a:bodyPr wrap="square" tIns="36000" bIns="36000">
             <a:spAutoFit/>
           </a:bodyPr>
           <a:lstStyle/>
@@ -4053,18 +4055,13 @@
               <a:buNone/>
             </a:pPr>
             <a:r>
-              <a:rPr lang="en-US" sz="2400" dirty="0" smtClean="0">
+              <a:rPr lang="en-US" sz="2400" dirty="0">
                 <a:solidFill>
                   <a:prstClr val="black"/>
                 </a:solidFill>
               </a:rPr>
               <a:t>:Minefield</a:t>
             </a:r>
-            <a:endParaRPr lang="en-US" sz="2400" dirty="0">
-              <a:solidFill>
-                <a:prstClr val="black"/>
-              </a:solidFill>
-            </a:endParaRPr>
           </a:p>
         </p:txBody>
       </p:sp>
@@ -4232,7 +4229,7 @@
           </a:lstStyle>
           <a:p>
             <a:r>
-              <a:rPr lang="en-US" sz="2400" dirty="0" smtClean="0">
+              <a:rPr lang="en-US" sz="2400" dirty="0">
                 <a:solidFill>
                   <a:srgbClr val="FF0000"/>
                 </a:solidFill>
@@ -4240,12 +4237,6 @@
               </a:rPr>
               <a:t> [else]</a:t>
             </a:r>
-            <a:endParaRPr lang="en-US" sz="2400" dirty="0">
-              <a:solidFill>
-                <a:srgbClr val="FF0000"/>
-              </a:solidFill>
-              <a:cs typeface="Arial" charset="0"/>
-            </a:endParaRPr>
           </a:p>
         </p:txBody>
       </p:sp>

</xml_diff>